<commit_message>
lição de ti terminada
</commit_message>
<xml_diff>
--- a/Liçãodeti.pptx
+++ b/Liçãodeti.pptx
@@ -247,7 +247,7 @@
           </a:lstStyle>
           <a:p>
             <a:r>
-              <a:rPr lang="pt-BR" smtClean="0"/>
+              <a:rPr lang="pt-BR"/>
               <a:t>Clique para editar o título mestre</a:t>
             </a:r>
             <a:endParaRPr lang="en-US" dirty="0"/>
@@ -319,7 +319,7 @@
           </a:lstStyle>
           <a:p>
             <a:r>
-              <a:rPr lang="pt-BR" smtClean="0"/>
+              <a:rPr lang="pt-BR"/>
               <a:t>Clique para editar o estilo do subtítulo Mestre</a:t>
             </a:r>
             <a:endParaRPr lang="en-US" dirty="0"/>
@@ -343,7 +343,7 @@
           <a:p>
             <a:fld id="{97DF46FF-822E-401F-A8DA-89A6DFE4E68A}" type="datetimeFigureOut">
               <a:rPr lang="pt-BR" smtClean="0"/>
-              <a:t>04/10/2019</a:t>
+              <a:t>06/10/2019</a:t>
             </a:fld>
             <a:endParaRPr lang="pt-BR"/>
           </a:p>
@@ -475,7 +475,7 @@
           <a:lstStyle/>
           <a:p>
             <a:r>
-              <a:rPr lang="pt-BR" smtClean="0"/>
+              <a:rPr lang="pt-BR"/>
               <a:t>Clique para editar o título mestre</a:t>
             </a:r>
             <a:endParaRPr lang="en-US" dirty="0"/>
@@ -499,35 +499,35 @@
           <a:p>
             <a:pPr lvl="0"/>
             <a:r>
-              <a:rPr lang="pt-BR" smtClean="0"/>
+              <a:rPr lang="pt-BR"/>
               <a:t>Editar estilos de texto Mestre</a:t>
             </a:r>
           </a:p>
           <a:p>
             <a:pPr lvl="1"/>
             <a:r>
-              <a:rPr lang="pt-BR" smtClean="0"/>
+              <a:rPr lang="pt-BR"/>
               <a:t>Segundo nível</a:t>
             </a:r>
           </a:p>
           <a:p>
             <a:pPr lvl="2"/>
             <a:r>
-              <a:rPr lang="pt-BR" smtClean="0"/>
+              <a:rPr lang="pt-BR"/>
               <a:t>Terceiro nível</a:t>
             </a:r>
           </a:p>
           <a:p>
             <a:pPr lvl="3"/>
             <a:r>
-              <a:rPr lang="pt-BR" smtClean="0"/>
+              <a:rPr lang="pt-BR"/>
               <a:t>Quarto nível</a:t>
             </a:r>
           </a:p>
           <a:p>
             <a:pPr lvl="4"/>
             <a:r>
-              <a:rPr lang="pt-BR" smtClean="0"/>
+              <a:rPr lang="pt-BR"/>
               <a:t>Quinto nível</a:t>
             </a:r>
             <a:endParaRPr lang="en-US" dirty="0"/>
@@ -551,7 +551,7 @@
           <a:p>
             <a:fld id="{97DF46FF-822E-401F-A8DA-89A6DFE4E68A}" type="datetimeFigureOut">
               <a:rPr lang="pt-BR" smtClean="0"/>
-              <a:t>04/10/2019</a:t>
+              <a:t>06/10/2019</a:t>
             </a:fld>
             <a:endParaRPr lang="pt-BR"/>
           </a:p>
@@ -726,7 +726,7 @@
           <a:lstStyle/>
           <a:p>
             <a:r>
-              <a:rPr lang="pt-BR" smtClean="0"/>
+              <a:rPr lang="pt-BR"/>
               <a:t>Clique para editar o título mestre</a:t>
             </a:r>
             <a:endParaRPr lang="en-US" dirty="0"/>
@@ -755,35 +755,35 @@
           <a:p>
             <a:pPr lvl="0"/>
             <a:r>
-              <a:rPr lang="pt-BR" smtClean="0"/>
+              <a:rPr lang="pt-BR"/>
               <a:t>Editar estilos de texto Mestre</a:t>
             </a:r>
           </a:p>
           <a:p>
             <a:pPr lvl="1"/>
             <a:r>
-              <a:rPr lang="pt-BR" smtClean="0"/>
+              <a:rPr lang="pt-BR"/>
               <a:t>Segundo nível</a:t>
             </a:r>
           </a:p>
           <a:p>
             <a:pPr lvl="2"/>
             <a:r>
-              <a:rPr lang="pt-BR" smtClean="0"/>
+              <a:rPr lang="pt-BR"/>
               <a:t>Terceiro nível</a:t>
             </a:r>
           </a:p>
           <a:p>
             <a:pPr lvl="3"/>
             <a:r>
-              <a:rPr lang="pt-BR" smtClean="0"/>
+              <a:rPr lang="pt-BR"/>
               <a:t>Quarto nível</a:t>
             </a:r>
           </a:p>
           <a:p>
             <a:pPr lvl="4"/>
             <a:r>
-              <a:rPr lang="pt-BR" smtClean="0"/>
+              <a:rPr lang="pt-BR"/>
               <a:t>Quinto nível</a:t>
             </a:r>
             <a:endParaRPr lang="en-US" dirty="0"/>
@@ -807,7 +807,7 @@
           <a:p>
             <a:fld id="{97DF46FF-822E-401F-A8DA-89A6DFE4E68A}" type="datetimeFigureOut">
               <a:rPr lang="pt-BR" smtClean="0"/>
-              <a:t>04/10/2019</a:t>
+              <a:t>06/10/2019</a:t>
             </a:fld>
             <a:endParaRPr lang="pt-BR"/>
           </a:p>
@@ -905,7 +905,7 @@
           </a:lstStyle>
           <a:p>
             <a:r>
-              <a:rPr lang="pt-BR" smtClean="0"/>
+              <a:rPr lang="pt-BR"/>
               <a:t>Clique para editar o título mestre</a:t>
             </a:r>
             <a:endParaRPr lang="en-US" dirty="0"/>
@@ -929,35 +929,35 @@
           <a:p>
             <a:pPr lvl="0"/>
             <a:r>
-              <a:rPr lang="pt-BR" smtClean="0"/>
+              <a:rPr lang="pt-BR"/>
               <a:t>Editar estilos de texto Mestre</a:t>
             </a:r>
           </a:p>
           <a:p>
             <a:pPr lvl="1"/>
             <a:r>
-              <a:rPr lang="pt-BR" smtClean="0"/>
+              <a:rPr lang="pt-BR"/>
               <a:t>Segundo nível</a:t>
             </a:r>
           </a:p>
           <a:p>
             <a:pPr lvl="2"/>
             <a:r>
-              <a:rPr lang="pt-BR" smtClean="0"/>
+              <a:rPr lang="pt-BR"/>
               <a:t>Terceiro nível</a:t>
             </a:r>
           </a:p>
           <a:p>
             <a:pPr lvl="3"/>
             <a:r>
-              <a:rPr lang="pt-BR" smtClean="0"/>
+              <a:rPr lang="pt-BR"/>
               <a:t>Quarto nível</a:t>
             </a:r>
           </a:p>
           <a:p>
             <a:pPr lvl="4"/>
             <a:r>
-              <a:rPr lang="pt-BR" smtClean="0"/>
+              <a:rPr lang="pt-BR"/>
               <a:t>Quinto nível</a:t>
             </a:r>
             <a:endParaRPr lang="en-US" dirty="0"/>
@@ -981,7 +981,7 @@
           <a:p>
             <a:fld id="{97DF46FF-822E-401F-A8DA-89A6DFE4E68A}" type="datetimeFigureOut">
               <a:rPr lang="pt-BR" smtClean="0"/>
-              <a:t>04/10/2019</a:t>
+              <a:t>06/10/2019</a:t>
             </a:fld>
             <a:endParaRPr lang="pt-BR"/>
           </a:p>
@@ -1180,7 +1180,7 @@
           </a:lstStyle>
           <a:p>
             <a:r>
-              <a:rPr lang="pt-BR" smtClean="0"/>
+              <a:rPr lang="pt-BR"/>
               <a:t>Clique para editar o título mestre</a:t>
             </a:r>
             <a:endParaRPr lang="en-US" dirty="0"/>
@@ -1301,7 +1301,7 @@
           <a:p>
             <a:pPr lvl="0"/>
             <a:r>
-              <a:rPr lang="pt-BR" smtClean="0"/>
+              <a:rPr lang="pt-BR"/>
               <a:t>Editar estilos de texto Mestre</a:t>
             </a:r>
           </a:p>
@@ -1324,7 +1324,7 @@
           <a:p>
             <a:fld id="{97DF46FF-822E-401F-A8DA-89A6DFE4E68A}" type="datetimeFigureOut">
               <a:rPr lang="pt-BR" smtClean="0"/>
-              <a:t>04/10/2019</a:t>
+              <a:t>06/10/2019</a:t>
             </a:fld>
             <a:endParaRPr lang="pt-BR"/>
           </a:p>
@@ -1461,7 +1461,7 @@
           <a:lstStyle/>
           <a:p>
             <a:r>
-              <a:rPr lang="pt-BR" smtClean="0"/>
+              <a:rPr lang="pt-BR"/>
               <a:t>Clique para editar o título mestre</a:t>
             </a:r>
             <a:endParaRPr lang="en-US" dirty="0"/>
@@ -1490,35 +1490,35 @@
           <a:p>
             <a:pPr lvl="0"/>
             <a:r>
-              <a:rPr lang="pt-BR" smtClean="0"/>
+              <a:rPr lang="pt-BR"/>
               <a:t>Editar estilos de texto Mestre</a:t>
             </a:r>
           </a:p>
           <a:p>
             <a:pPr lvl="1"/>
             <a:r>
-              <a:rPr lang="pt-BR" smtClean="0"/>
+              <a:rPr lang="pt-BR"/>
               <a:t>Segundo nível</a:t>
             </a:r>
           </a:p>
           <a:p>
             <a:pPr lvl="2"/>
             <a:r>
-              <a:rPr lang="pt-BR" smtClean="0"/>
+              <a:rPr lang="pt-BR"/>
               <a:t>Terceiro nível</a:t>
             </a:r>
           </a:p>
           <a:p>
             <a:pPr lvl="3"/>
             <a:r>
-              <a:rPr lang="pt-BR" smtClean="0"/>
+              <a:rPr lang="pt-BR"/>
               <a:t>Quarto nível</a:t>
             </a:r>
           </a:p>
           <a:p>
             <a:pPr lvl="4"/>
             <a:r>
-              <a:rPr lang="pt-BR" smtClean="0"/>
+              <a:rPr lang="pt-BR"/>
               <a:t>Quinto nível</a:t>
             </a:r>
             <a:endParaRPr lang="en-US" dirty="0"/>
@@ -1547,35 +1547,35 @@
           <a:p>
             <a:pPr lvl="0"/>
             <a:r>
-              <a:rPr lang="pt-BR" smtClean="0"/>
+              <a:rPr lang="pt-BR"/>
               <a:t>Editar estilos de texto Mestre</a:t>
             </a:r>
           </a:p>
           <a:p>
             <a:pPr lvl="1"/>
             <a:r>
-              <a:rPr lang="pt-BR" smtClean="0"/>
+              <a:rPr lang="pt-BR"/>
               <a:t>Segundo nível</a:t>
             </a:r>
           </a:p>
           <a:p>
             <a:pPr lvl="2"/>
             <a:r>
-              <a:rPr lang="pt-BR" smtClean="0"/>
+              <a:rPr lang="pt-BR"/>
               <a:t>Terceiro nível</a:t>
             </a:r>
           </a:p>
           <a:p>
             <a:pPr lvl="3"/>
             <a:r>
-              <a:rPr lang="pt-BR" smtClean="0"/>
+              <a:rPr lang="pt-BR"/>
               <a:t>Quarto nível</a:t>
             </a:r>
           </a:p>
           <a:p>
             <a:pPr lvl="4"/>
             <a:r>
-              <a:rPr lang="pt-BR" smtClean="0"/>
+              <a:rPr lang="pt-BR"/>
               <a:t>Quinto nível</a:t>
             </a:r>
             <a:endParaRPr lang="en-US" dirty="0"/>
@@ -1599,7 +1599,7 @@
           <a:p>
             <a:fld id="{97DF46FF-822E-401F-A8DA-89A6DFE4E68A}" type="datetimeFigureOut">
               <a:rPr lang="pt-BR" smtClean="0"/>
-              <a:t>04/10/2019</a:t>
+              <a:t>06/10/2019</a:t>
             </a:fld>
             <a:endParaRPr lang="pt-BR"/>
           </a:p>
@@ -1698,7 +1698,7 @@
           <a:lstStyle/>
           <a:p>
             <a:r>
-              <a:rPr lang="pt-BR" smtClean="0"/>
+              <a:rPr lang="pt-BR"/>
               <a:t>Clique para editar o título mestre</a:t>
             </a:r>
             <a:endParaRPr lang="en-US" dirty="0"/>
@@ -1770,7 +1770,7 @@
           <a:p>
             <a:pPr lvl="0"/>
             <a:r>
-              <a:rPr lang="pt-BR" smtClean="0"/>
+              <a:rPr lang="pt-BR"/>
               <a:t>Editar estilos de texto Mestre</a:t>
             </a:r>
           </a:p>
@@ -1798,35 +1798,35 @@
           <a:p>
             <a:pPr lvl="0"/>
             <a:r>
-              <a:rPr lang="pt-BR" smtClean="0"/>
+              <a:rPr lang="pt-BR"/>
               <a:t>Editar estilos de texto Mestre</a:t>
             </a:r>
           </a:p>
           <a:p>
             <a:pPr lvl="1"/>
             <a:r>
-              <a:rPr lang="pt-BR" smtClean="0"/>
+              <a:rPr lang="pt-BR"/>
               <a:t>Segundo nível</a:t>
             </a:r>
           </a:p>
           <a:p>
             <a:pPr lvl="2"/>
             <a:r>
-              <a:rPr lang="pt-BR" smtClean="0"/>
+              <a:rPr lang="pt-BR"/>
               <a:t>Terceiro nível</a:t>
             </a:r>
           </a:p>
           <a:p>
             <a:pPr lvl="3"/>
             <a:r>
-              <a:rPr lang="pt-BR" smtClean="0"/>
+              <a:rPr lang="pt-BR"/>
               <a:t>Quarto nível</a:t>
             </a:r>
           </a:p>
           <a:p>
             <a:pPr lvl="4"/>
             <a:r>
-              <a:rPr lang="pt-BR" smtClean="0"/>
+              <a:rPr lang="pt-BR"/>
               <a:t>Quinto nível</a:t>
             </a:r>
             <a:endParaRPr lang="en-US" dirty="0"/>
@@ -1898,7 +1898,7 @@
           <a:p>
             <a:pPr lvl="0"/>
             <a:r>
-              <a:rPr lang="pt-BR" smtClean="0"/>
+              <a:rPr lang="pt-BR"/>
               <a:t>Editar estilos de texto Mestre</a:t>
             </a:r>
           </a:p>
@@ -1926,35 +1926,35 @@
           <a:p>
             <a:pPr lvl="0"/>
             <a:r>
-              <a:rPr lang="pt-BR" smtClean="0"/>
+              <a:rPr lang="pt-BR"/>
               <a:t>Editar estilos de texto Mestre</a:t>
             </a:r>
           </a:p>
           <a:p>
             <a:pPr lvl="1"/>
             <a:r>
-              <a:rPr lang="pt-BR" smtClean="0"/>
+              <a:rPr lang="pt-BR"/>
               <a:t>Segundo nível</a:t>
             </a:r>
           </a:p>
           <a:p>
             <a:pPr lvl="2"/>
             <a:r>
-              <a:rPr lang="pt-BR" smtClean="0"/>
+              <a:rPr lang="pt-BR"/>
               <a:t>Terceiro nível</a:t>
             </a:r>
           </a:p>
           <a:p>
             <a:pPr lvl="3"/>
             <a:r>
-              <a:rPr lang="pt-BR" smtClean="0"/>
+              <a:rPr lang="pt-BR"/>
               <a:t>Quarto nível</a:t>
             </a:r>
           </a:p>
           <a:p>
             <a:pPr lvl="4"/>
             <a:r>
-              <a:rPr lang="pt-BR" smtClean="0"/>
+              <a:rPr lang="pt-BR"/>
               <a:t>Quinto nível</a:t>
             </a:r>
             <a:endParaRPr lang="en-US" dirty="0"/>
@@ -1978,7 +1978,7 @@
           <a:p>
             <a:fld id="{97DF46FF-822E-401F-A8DA-89A6DFE4E68A}" type="datetimeFigureOut">
               <a:rPr lang="pt-BR" smtClean="0"/>
-              <a:t>04/10/2019</a:t>
+              <a:t>06/10/2019</a:t>
             </a:fld>
             <a:endParaRPr lang="pt-BR"/>
           </a:p>
@@ -2072,7 +2072,7 @@
           <a:lstStyle/>
           <a:p>
             <a:r>
-              <a:rPr lang="pt-BR" smtClean="0"/>
+              <a:rPr lang="pt-BR"/>
               <a:t>Clique para editar o título mestre</a:t>
             </a:r>
             <a:endParaRPr lang="en-US" dirty="0"/>
@@ -2096,7 +2096,7 @@
           <a:p>
             <a:fld id="{97DF46FF-822E-401F-A8DA-89A6DFE4E68A}" type="datetimeFigureOut">
               <a:rPr lang="pt-BR" smtClean="0"/>
-              <a:t>04/10/2019</a:t>
+              <a:t>06/10/2019</a:t>
             </a:fld>
             <a:endParaRPr lang="pt-BR"/>
           </a:p>
@@ -2267,7 +2267,7 @@
           <a:p>
             <a:fld id="{97DF46FF-822E-401F-A8DA-89A6DFE4E68A}" type="datetimeFigureOut">
               <a:rPr lang="pt-BR" smtClean="0"/>
-              <a:t>04/10/2019</a:t>
+              <a:t>06/10/2019</a:t>
             </a:fld>
             <a:endParaRPr lang="pt-BR"/>
           </a:p>
@@ -2460,7 +2460,7 @@
           </a:lstStyle>
           <a:p>
             <a:r>
-              <a:rPr lang="pt-BR" smtClean="0"/>
+              <a:rPr lang="pt-BR"/>
               <a:t>Clique para editar o título mestre</a:t>
             </a:r>
             <a:endParaRPr lang="en-US" dirty="0"/>
@@ -2489,35 +2489,35 @@
           <a:p>
             <a:pPr lvl="0"/>
             <a:r>
-              <a:rPr lang="pt-BR" smtClean="0"/>
+              <a:rPr lang="pt-BR"/>
               <a:t>Editar estilos de texto Mestre</a:t>
             </a:r>
           </a:p>
           <a:p>
             <a:pPr lvl="1"/>
             <a:r>
-              <a:rPr lang="pt-BR" smtClean="0"/>
+              <a:rPr lang="pt-BR"/>
               <a:t>Segundo nível</a:t>
             </a:r>
           </a:p>
           <a:p>
             <a:pPr lvl="2"/>
             <a:r>
-              <a:rPr lang="pt-BR" smtClean="0"/>
+              <a:rPr lang="pt-BR"/>
               <a:t>Terceiro nível</a:t>
             </a:r>
           </a:p>
           <a:p>
             <a:pPr lvl="3"/>
             <a:r>
-              <a:rPr lang="pt-BR" smtClean="0"/>
+              <a:rPr lang="pt-BR"/>
               <a:t>Quarto nível</a:t>
             </a:r>
           </a:p>
           <a:p>
             <a:pPr lvl="4"/>
             <a:r>
-              <a:rPr lang="pt-BR" smtClean="0"/>
+              <a:rPr lang="pt-BR"/>
               <a:t>Quinto nível</a:t>
             </a:r>
             <a:endParaRPr lang="en-US" dirty="0"/>
@@ -2589,7 +2589,7 @@
           <a:p>
             <a:pPr lvl="0"/>
             <a:r>
-              <a:rPr lang="pt-BR" smtClean="0"/>
+              <a:rPr lang="pt-BR"/>
               <a:t>Editar estilos de texto Mestre</a:t>
             </a:r>
           </a:p>
@@ -2621,7 +2621,7 @@
           <a:p>
             <a:fld id="{97DF46FF-822E-401F-A8DA-89A6DFE4E68A}" type="datetimeFigureOut">
               <a:rPr lang="pt-BR" smtClean="0"/>
-              <a:t>04/10/2019</a:t>
+              <a:t>06/10/2019</a:t>
             </a:fld>
             <a:endParaRPr lang="pt-BR"/>
           </a:p>
@@ -2827,7 +2827,7 @@
           </a:lstStyle>
           <a:p>
             <a:r>
-              <a:rPr lang="pt-BR" smtClean="0"/>
+              <a:rPr lang="pt-BR"/>
               <a:t>Clique para editar o título mestre</a:t>
             </a:r>
             <a:endParaRPr lang="en-US" dirty="0"/>
@@ -2902,7 +2902,7 @@
           </a:lstStyle>
           <a:p>
             <a:r>
-              <a:rPr lang="pt-BR" smtClean="0"/>
+              <a:rPr lang="pt-BR"/>
               <a:t>Clique no ícone para adicionar uma imagem</a:t>
             </a:r>
             <a:endParaRPr lang="en-US" dirty="0"/>
@@ -2980,7 +2980,7 @@
           <a:p>
             <a:pPr lvl="0"/>
             <a:r>
-              <a:rPr lang="pt-BR" smtClean="0"/>
+              <a:rPr lang="pt-BR"/>
               <a:t>Editar estilos de texto Mestre</a:t>
             </a:r>
           </a:p>
@@ -3003,7 +3003,7 @@
           <a:p>
             <a:fld id="{97DF46FF-822E-401F-A8DA-89A6DFE4E68A}" type="datetimeFigureOut">
               <a:rPr lang="pt-BR" smtClean="0"/>
-              <a:t>04/10/2019</a:t>
+              <a:t>06/10/2019</a:t>
             </a:fld>
             <a:endParaRPr lang="pt-BR"/>
           </a:p>
@@ -3188,7 +3188,7 @@
           <a:lstStyle/>
           <a:p>
             <a:r>
-              <a:rPr lang="pt-BR" smtClean="0"/>
+              <a:rPr lang="pt-BR"/>
               <a:t>Clique para editar o título mestre</a:t>
             </a:r>
             <a:endParaRPr lang="en-US" dirty="0"/>
@@ -3222,35 +3222,35 @@
           <a:p>
             <a:pPr lvl="0"/>
             <a:r>
-              <a:rPr lang="pt-BR" smtClean="0"/>
+              <a:rPr lang="pt-BR"/>
               <a:t>Editar estilos de texto Mestre</a:t>
             </a:r>
           </a:p>
           <a:p>
             <a:pPr lvl="1"/>
             <a:r>
-              <a:rPr lang="pt-BR" smtClean="0"/>
+              <a:rPr lang="pt-BR"/>
               <a:t>Segundo nível</a:t>
             </a:r>
           </a:p>
           <a:p>
             <a:pPr lvl="2"/>
             <a:r>
-              <a:rPr lang="pt-BR" smtClean="0"/>
+              <a:rPr lang="pt-BR"/>
               <a:t>Terceiro nível</a:t>
             </a:r>
           </a:p>
           <a:p>
             <a:pPr lvl="3"/>
             <a:r>
-              <a:rPr lang="pt-BR" smtClean="0"/>
+              <a:rPr lang="pt-BR"/>
               <a:t>Quarto nível</a:t>
             </a:r>
           </a:p>
           <a:p>
             <a:pPr lvl="4"/>
             <a:r>
-              <a:rPr lang="pt-BR" smtClean="0"/>
+              <a:rPr lang="pt-BR"/>
               <a:t>Quinto nível</a:t>
             </a:r>
             <a:endParaRPr lang="en-US" dirty="0"/>
@@ -3290,7 +3290,7 @@
           <a:p>
             <a:fld id="{97DF46FF-822E-401F-A8DA-89A6DFE4E68A}" type="datetimeFigureOut">
               <a:rPr lang="pt-BR" smtClean="0"/>
-              <a:t>04/10/2019</a:t>
+              <a:t>06/10/2019</a:t>
             </a:fld>
             <a:endParaRPr lang="pt-BR"/>
           </a:p>
@@ -3830,10 +3830,9 @@
           <a:lstStyle/>
           <a:p>
             <a:r>
-              <a:rPr lang="pt-BR" dirty="0" smtClean="0"/>
+              <a:rPr lang="pt-BR" dirty="0"/>
               <a:t>M.E.E.R</a:t>
             </a:r>
-            <a:endParaRPr lang="pt-BR" dirty="0"/>
           </a:p>
         </p:txBody>
       </p:sp>
@@ -3853,16 +3852,15 @@
           <a:lstStyle/>
           <a:p>
             <a:r>
-              <a:rPr lang="pt-BR" dirty="0" smtClean="0"/>
+              <a:rPr lang="pt-BR" dirty="0"/>
               <a:t>Medidor de energia elétrica residencial</a:t>
             </a:r>
           </a:p>
           <a:p>
             <a:r>
-              <a:rPr lang="pt-BR" dirty="0" smtClean="0"/>
+              <a:rPr lang="pt-BR" dirty="0"/>
               <a:t>Nome: Gabriel vieira rodrigues de oliveira</a:t>
             </a:r>
-            <a:endParaRPr lang="pt-BR" dirty="0"/>
           </a:p>
         </p:txBody>
       </p:sp>
@@ -3876,13 +3874,6 @@
   <p:clrMapOvr>
     <a:masterClrMapping/>
   </p:clrMapOvr>
-  <p:timing>
-    <p:tnLst>
-      <p:par>
-        <p:cTn id="1" dur="indefinite" restart="never" nodeType="tmRoot"/>
-      </p:par>
-    </p:tnLst>
-  </p:timing>
 </p:sld>
 </file>
 
@@ -4430,18 +4421,17 @@
           <a:p>
             <a:pPr algn="ctr"/>
             <a:r>
-              <a:rPr lang="pt-BR" dirty="0" smtClean="0"/>
+              <a:rPr lang="pt-BR" dirty="0"/>
               <a:t>Sensor mede a energia consumida e envia as informações para o </a:t>
             </a:r>
             <a:r>
-              <a:rPr lang="pt-BR" dirty="0" err="1" smtClean="0"/>
+              <a:rPr lang="pt-BR" dirty="0" err="1"/>
               <a:t>arduino</a:t>
             </a:r>
             <a:r>
-              <a:rPr lang="pt-BR" dirty="0" smtClean="0"/>
+              <a:rPr lang="pt-BR" dirty="0"/>
               <a:t> </a:t>
             </a:r>
-            <a:endParaRPr lang="pt-BR" dirty="0"/>
           </a:p>
         </p:txBody>
       </p:sp>
@@ -4469,18 +4459,17 @@
           <a:p>
             <a:pPr algn="ctr"/>
             <a:r>
-              <a:rPr lang="pt-BR" dirty="0" smtClean="0"/>
+              <a:rPr lang="pt-BR" dirty="0"/>
               <a:t>O </a:t>
             </a:r>
             <a:r>
-              <a:rPr lang="pt-BR" dirty="0" err="1" smtClean="0"/>
+              <a:rPr lang="pt-BR" dirty="0" err="1"/>
               <a:t>arduino</a:t>
             </a:r>
             <a:r>
-              <a:rPr lang="pt-BR" dirty="0" smtClean="0"/>
+              <a:rPr lang="pt-BR" dirty="0"/>
               <a:t> capta essas informações e calcula o quanto de energia foi consumido</a:t>
             </a:r>
-            <a:endParaRPr lang="pt-BR" dirty="0"/>
           </a:p>
         </p:txBody>
       </p:sp>
@@ -4507,18 +4496,17 @@
           <a:lstStyle/>
           <a:p>
             <a:r>
-              <a:rPr lang="pt-BR" dirty="0" smtClean="0"/>
+              <a:rPr lang="pt-BR" dirty="0"/>
               <a:t>A informação é enviada pelo </a:t>
             </a:r>
             <a:r>
-              <a:rPr lang="pt-BR" dirty="0" err="1" smtClean="0"/>
+              <a:rPr lang="pt-BR" dirty="0" err="1"/>
               <a:t>wi-fi</a:t>
             </a:r>
             <a:r>
-              <a:rPr lang="pt-BR" dirty="0" smtClean="0"/>
+              <a:rPr lang="pt-BR" dirty="0"/>
               <a:t> até o usuário</a:t>
             </a:r>
-            <a:endParaRPr lang="pt-BR" dirty="0"/>
           </a:p>
         </p:txBody>
       </p:sp>
@@ -4546,24 +4534,23 @@
           <a:p>
             <a:pPr algn="ctr"/>
             <a:r>
-              <a:rPr lang="pt-BR" dirty="0" smtClean="0"/>
+              <a:rPr lang="pt-BR" dirty="0"/>
               <a:t>O usuário por meio de aplicativo ou site consegue</a:t>
             </a:r>
           </a:p>
           <a:p>
             <a:pPr algn="ctr"/>
             <a:r>
-              <a:rPr lang="pt-BR" dirty="0" smtClean="0"/>
+              <a:rPr lang="pt-BR" dirty="0"/>
               <a:t>visualizar seu consumo mensal em gráficos e fazer </a:t>
             </a:r>
           </a:p>
           <a:p>
             <a:pPr algn="ctr"/>
             <a:r>
-              <a:rPr lang="pt-BR" dirty="0" smtClean="0"/>
+              <a:rPr lang="pt-BR" dirty="0"/>
               <a:t>planos para economizar energia assim gastando menos dinheiro</a:t>
             </a:r>
-            <a:endParaRPr lang="pt-BR" dirty="0"/>
           </a:p>
         </p:txBody>
       </p:sp>
@@ -4590,10 +4577,9 @@
           <a:lstStyle/>
           <a:p>
             <a:r>
-              <a:rPr lang="pt-BR" sz="2800" dirty="0" smtClean="0"/>
+              <a:rPr lang="pt-BR" sz="2800" dirty="0"/>
               <a:t>Diagrama de Solução</a:t>
             </a:r>
-            <a:endParaRPr lang="pt-BR" sz="2800" dirty="0"/>
           </a:p>
         </p:txBody>
       </p:sp>
@@ -4607,13 +4593,6 @@
   <p:clrMapOvr>
     <a:masterClrMapping/>
   </p:clrMapOvr>
-  <p:timing>
-    <p:tnLst>
-      <p:par>
-        <p:cTn id="1" dur="indefinite" restart="never" nodeType="tmRoot"/>
-      </p:par>
-    </p:tnLst>
-  </p:timing>
 </p:sld>
 </file>
 
@@ -4650,10 +4629,9 @@
           <a:lstStyle/>
           <a:p>
             <a:r>
-              <a:rPr lang="pt-BR" dirty="0" smtClean="0"/>
+              <a:rPr lang="pt-BR" dirty="0"/>
               <a:t>Lista de Requisitos</a:t>
             </a:r>
-            <a:endParaRPr lang="pt-BR" dirty="0"/>
           </a:p>
         </p:txBody>
       </p:sp>
@@ -4673,39 +4651,39 @@
           <a:lstStyle/>
           <a:p>
             <a:r>
-              <a:rPr lang="pt-BR" dirty="0" smtClean="0"/>
+              <a:rPr lang="pt-BR" dirty="0"/>
               <a:t>Ter conexão com a internet.</a:t>
             </a:r>
           </a:p>
           <a:p>
             <a:r>
-              <a:rPr lang="pt-BR" dirty="0" smtClean="0"/>
+              <a:rPr lang="pt-BR" dirty="0"/>
               <a:t>Fazer o </a:t>
             </a:r>
             <a:r>
-              <a:rPr lang="pt-BR" dirty="0" err="1" smtClean="0"/>
+              <a:rPr lang="pt-BR" dirty="0" err="1"/>
               <a:t>login</a:t>
             </a:r>
             <a:r>
-              <a:rPr lang="pt-BR" dirty="0" smtClean="0"/>
+              <a:rPr lang="pt-BR" dirty="0"/>
               <a:t> no aplicativo corretamente.</a:t>
             </a:r>
           </a:p>
           <a:p>
             <a:r>
-              <a:rPr lang="pt-BR" dirty="0" smtClean="0"/>
+              <a:rPr lang="pt-BR" dirty="0"/>
               <a:t>Instalar o sensor corretamente em um lugar seco.</a:t>
             </a:r>
           </a:p>
           <a:p>
             <a:r>
-              <a:rPr lang="pt-BR" dirty="0" smtClean="0"/>
+              <a:rPr lang="pt-BR" dirty="0"/>
               <a:t>Caso coloque o sensor em um equipamento certificar que apenas um fio estará no sensor nunca os dois.</a:t>
             </a:r>
           </a:p>
           <a:p>
             <a:r>
-              <a:rPr lang="pt-BR" dirty="0" smtClean="0"/>
+              <a:rPr lang="pt-BR" dirty="0"/>
               <a:t>Caso coloque o sensor na caixa de disjuntores para medir o fio mestre, certificar que o sensor estará no fio-mestre Fase.</a:t>
             </a:r>
           </a:p>
@@ -4721,13 +4699,6 @@
   <p:clrMapOvr>
     <a:masterClrMapping/>
   </p:clrMapOvr>
-  <p:timing>
-    <p:tnLst>
-      <p:par>
-        <p:cTn id="1" dur="indefinite" restart="never" nodeType="tmRoot"/>
-      </p:par>
-    </p:tnLst>
-  </p:timing>
 </p:sld>
 </file>
 
@@ -4764,10 +4735,9 @@
           <a:lstStyle/>
           <a:p>
             <a:r>
-              <a:rPr lang="pt-BR" dirty="0" smtClean="0"/>
+              <a:rPr lang="pt-BR" dirty="0"/>
               <a:t>Testes	</a:t>
             </a:r>
-            <a:endParaRPr lang="pt-BR" dirty="0"/>
           </a:p>
         </p:txBody>
       </p:sp>
@@ -4789,58 +4759,57 @@
           <a:lstStyle/>
           <a:p>
             <a:r>
-              <a:rPr lang="pt-BR" dirty="0" smtClean="0"/>
+              <a:rPr lang="pt-BR" dirty="0"/>
               <a:t>Para testar se a conexão com a internet, o aplicativo deve enviar uma mensagem e receber uma resposta, se a resposta não for condizente com a mensagem enviada ao servidor o aplicativo não está conectado a internet.</a:t>
             </a:r>
           </a:p>
           <a:p>
             <a:r>
-              <a:rPr lang="pt-BR" dirty="0" smtClean="0"/>
+              <a:rPr lang="pt-BR" dirty="0"/>
               <a:t>Para testar se está tendo um </a:t>
             </a:r>
             <a:r>
-              <a:rPr lang="pt-BR" dirty="0" err="1" smtClean="0"/>
+              <a:rPr lang="pt-BR" dirty="0" err="1"/>
               <a:t>login</a:t>
             </a:r>
             <a:r>
-              <a:rPr lang="pt-BR" dirty="0" smtClean="0"/>
+              <a:rPr lang="pt-BR" dirty="0"/>
               <a:t> corretamente no site, o </a:t>
             </a:r>
             <a:r>
-              <a:rPr lang="pt-BR" dirty="0" err="1" smtClean="0"/>
+              <a:rPr lang="pt-BR" dirty="0" err="1"/>
               <a:t>login</a:t>
             </a:r>
             <a:r>
-              <a:rPr lang="pt-BR" dirty="0" smtClean="0"/>
+              <a:rPr lang="pt-BR" dirty="0"/>
               <a:t> e a senha que foi digitado no campo deve ser os mesmo que estão no banco de dados cadastrado, para testar simularíamos um usuário digitando a senha ou o </a:t>
             </a:r>
             <a:r>
-              <a:rPr lang="pt-BR" dirty="0" err="1" smtClean="0"/>
+              <a:rPr lang="pt-BR" dirty="0" err="1"/>
               <a:t>login</a:t>
             </a:r>
             <a:r>
-              <a:rPr lang="pt-BR" dirty="0" smtClean="0"/>
+              <a:rPr lang="pt-BR" dirty="0"/>
               <a:t> errados para ver como o sistema se comportaria.</a:t>
             </a:r>
           </a:p>
           <a:p>
             <a:r>
-              <a:rPr lang="pt-BR" dirty="0" smtClean="0"/>
+              <a:rPr lang="pt-BR" dirty="0"/>
               <a:t>Para saber se o equipamento foi instalado em um lugar seco, o sensor de umidade enviaria a informação para o servidor e se a umidade for maior que 60% o software enviará um alerta para usuário avisando do perigo de curto-circuito.</a:t>
             </a:r>
           </a:p>
           <a:p>
             <a:r>
-              <a:rPr lang="pt-BR" dirty="0" smtClean="0"/>
+              <a:rPr lang="pt-BR" dirty="0"/>
               <a:t>Para testar se o equipamento foi devidamente instalado de forma correta o valor lido pelo sensor e enviado para o sistema tem que ser diferente de 0.</a:t>
             </a:r>
           </a:p>
           <a:p>
             <a:r>
-              <a:rPr lang="pt-BR" dirty="0" smtClean="0"/>
+              <a:rPr lang="pt-BR" dirty="0"/>
               <a:t>Para saber se o equipamento foi devidamente instalado no fio mestre fase a leitura captada pelo sensor deverá ultrapassar 30 Amperes</a:t>
             </a:r>
-            <a:endParaRPr lang="pt-BR" dirty="0"/>
           </a:p>
         </p:txBody>
       </p:sp>
@@ -4854,13 +4823,6 @@
   <p:clrMapOvr>
     <a:masterClrMapping/>
   </p:clrMapOvr>
-  <p:timing>
-    <p:tnLst>
-      <p:par>
-        <p:cTn id="1" dur="indefinite" restart="never" nodeType="tmRoot"/>
-      </p:par>
-    </p:tnLst>
-  </p:timing>
 </p:sld>
 </file>
 
@@ -4897,10 +4859,9 @@
           <a:lstStyle/>
           <a:p>
             <a:r>
-              <a:rPr lang="pt-BR" dirty="0" smtClean="0"/>
+              <a:rPr lang="pt-BR" dirty="0"/>
               <a:t>Homologação</a:t>
             </a:r>
-            <a:endParaRPr lang="pt-BR" dirty="0"/>
           </a:p>
         </p:txBody>
       </p:sp>
@@ -4920,29 +4881,29 @@
           <a:lstStyle/>
           <a:p>
             <a:r>
-              <a:rPr lang="pt-BR" dirty="0" smtClean="0"/>
+              <a:rPr lang="pt-BR" dirty="0"/>
               <a:t>Para o cliente saber se ele não está conectado na internet ao ele iniciar no aplicativo aparecerá um aviso de “Sem conexão com a internet, por favor tente mais tarde”</a:t>
             </a:r>
           </a:p>
           <a:p>
             <a:r>
-              <a:rPr lang="pt-BR" dirty="0" smtClean="0"/>
+              <a:rPr lang="pt-BR" dirty="0"/>
               <a:t>Para o cliente saber o que que o cadastro e </a:t>
             </a:r>
             <a:r>
-              <a:rPr lang="pt-BR" dirty="0" err="1" smtClean="0"/>
+              <a:rPr lang="pt-BR" dirty="0" err="1"/>
               <a:t>login</a:t>
             </a:r>
             <a:r>
-              <a:rPr lang="pt-BR" dirty="0" smtClean="0"/>
+              <a:rPr lang="pt-BR" dirty="0"/>
               <a:t> dele foi efetivado, ao entrar na tela de </a:t>
             </a:r>
             <a:r>
-              <a:rPr lang="pt-BR" dirty="0" err="1" smtClean="0"/>
+              <a:rPr lang="pt-BR" dirty="0" err="1"/>
               <a:t>login</a:t>
             </a:r>
             <a:r>
-              <a:rPr lang="pt-BR" dirty="0" smtClean="0"/>
+              <a:rPr lang="pt-BR" dirty="0"/>
               <a:t> após ele ter concluído o cadastro, ele ira colocar seus dados e caso for correto irá entrar automaticamente na tela inicial do aparelho, caso os dados forem inválidos, aparecerá uma mensagem na tela “Usuário ou senha incorretos”</a:t>
             </a:r>
           </a:p>
@@ -4961,13 +4922,6 @@
   <p:clrMapOvr>
     <a:masterClrMapping/>
   </p:clrMapOvr>
-  <p:timing>
-    <p:tnLst>
-      <p:par>
-        <p:cTn id="1" dur="indefinite" restart="never" nodeType="tmRoot"/>
-      </p:par>
-    </p:tnLst>
-  </p:timing>
 </p:sld>
 </file>
 
@@ -5004,10 +4958,9 @@
           <a:lstStyle/>
           <a:p>
             <a:r>
-              <a:rPr lang="pt-BR" dirty="0" smtClean="0"/>
+              <a:rPr lang="pt-BR" dirty="0"/>
               <a:t>Plano de Implantação</a:t>
             </a:r>
-            <a:endParaRPr lang="pt-BR" dirty="0"/>
           </a:p>
         </p:txBody>
       </p:sp>
@@ -5026,7 +4979,16 @@
           <a:bodyPr/>
           <a:lstStyle/>
           <a:p>
-            <a:endParaRPr lang="pt-BR"/>
+            <a:r>
+              <a:rPr lang="pt-BR" dirty="0"/>
+              <a:t>Para implementar alguma atualização do sistema, teria que pausar as operações do aplicativo, porém os dados do cliente não poderiam ser pausados, então aparecera uma tela ao iniciar o aplicativo “Um momento nossos desenvolvedores estão realizando atualizações para deixar sua experiencia conosco, por favor tente novamente mais tarde”. </a:t>
+            </a:r>
+          </a:p>
+          <a:p>
+            <a:r>
+              <a:rPr lang="pt-BR" dirty="0"/>
+              <a:t>Então só quando o aplicativo atualizado estiver totalmente subido no servidor a tela desaparecerá, e aparecerá uma tela com as novidades dessa atualização.</a:t>
+            </a:r>
           </a:p>
         </p:txBody>
       </p:sp>

</xml_diff>